<commit_message>
with updated parts list
</commit_message>
<xml_diff>
--- a/project_01/docs/lim_ENGI301_project_01_proposal.pptx
+++ b/project_01/docs/lim_ENGI301_project_01_proposal.pptx
@@ -218,7 +218,7 @@
           <a:p>
             <a:fld id="{59041DB8-B66F-4DC8-A96E-33677E0F90FF}" type="datetimeFigureOut">
               <a:rPr lang="en-US" smtClean="0"/>
-              <a:t>2/13/2023</a:t>
+              <a:t>2/17/2023</a:t>
             </a:fld>
             <a:endParaRPr lang="en-US"/>
           </a:p>
@@ -383,7 +383,7 @@
           <a:p>
             <a:fld id="{DEB49C4A-65AC-492D-9701-81B46C3AD0E4}" type="datetimeFigureOut">
               <a:rPr lang="en-US" smtClean="0"/>
-              <a:t>2/13/2023</a:t>
+              <a:t>2/17/2023</a:t>
             </a:fld>
             <a:endParaRPr lang="en-US"/>
           </a:p>
@@ -2791,7 +2791,7 @@
           <a:p>
             <a:fld id="{384A29A4-78C8-47AB-BA06-22CB45938951}" type="datetime1">
               <a:rPr lang="en-US" smtClean="0"/>
-              <a:t>2/13/2023</a:t>
+              <a:t>2/17/2023</a:t>
             </a:fld>
             <a:endParaRPr lang="en-US"/>
           </a:p>
@@ -2986,7 +2986,7 @@
           <a:p>
             <a:fld id="{E1ED4ACF-2D82-46F2-A8E9-23963AA34E86}" type="datetime1">
               <a:rPr lang="en-US" smtClean="0"/>
-              <a:t>2/13/2023</a:t>
+              <a:t>2/17/2023</a:t>
             </a:fld>
             <a:endParaRPr lang="en-US"/>
           </a:p>
@@ -3180,7 +3180,7 @@
           <a:p>
             <a:fld id="{AE374B5B-21A0-4192-BF4C-38187F1A68D8}" type="datetime1">
               <a:rPr lang="en-US" smtClean="0"/>
-              <a:t>2/13/2023</a:t>
+              <a:t>2/17/2023</a:t>
             </a:fld>
             <a:endParaRPr lang="en-US"/>
           </a:p>
@@ -5521,7 +5521,7 @@
           <a:p>
             <a:fld id="{33B5CF7C-B333-48E1-A4A6-83A3C8B73AC0}" type="datetime1">
               <a:rPr lang="en-US" smtClean="0"/>
-              <a:t>2/13/2023</a:t>
+              <a:t>2/17/2023</a:t>
             </a:fld>
             <a:endParaRPr lang="en-US"/>
           </a:p>
@@ -5974,7 +5974,7 @@
           <a:p>
             <a:fld id="{AE320762-5CBF-4210-AB54-376B091119F8}" type="datetime1">
               <a:rPr lang="en-US" smtClean="0"/>
-              <a:t>2/13/2023</a:t>
+              <a:t>2/17/2023</a:t>
             </a:fld>
             <a:endParaRPr lang="en-US"/>
           </a:p>
@@ -6106,7 +6106,7 @@
           <a:p>
             <a:fld id="{7F0DB371-BF5F-4058-A212-1A908E4D2674}" type="datetime1">
               <a:rPr lang="en-US" smtClean="0"/>
-              <a:t>2/13/2023</a:t>
+              <a:t>2/17/2023</a:t>
             </a:fld>
             <a:endParaRPr lang="en-US"/>
           </a:p>
@@ -8039,7 +8039,7 @@
           <a:p>
             <a:fld id="{60A4083B-90AA-48CF-BAD5-00AA24D7F288}" type="datetime1">
               <a:rPr lang="en-US" smtClean="0"/>
-              <a:t>2/13/2023</a:t>
+              <a:t>2/17/2023</a:t>
             </a:fld>
             <a:endParaRPr lang="en-US"/>
           </a:p>
@@ -10298,7 +10298,7 @@
             <a:fld id="{F5BAF629-ECA2-4CF3-B790-9D9BDED98269}" type="datetime1">
               <a:rPr lang="en-US" smtClean="0"/>
               <a:pPr/>
-              <a:t>2/13/2023</a:t>
+              <a:t>2/17/2023</a:t>
             </a:fld>
             <a:endParaRPr lang="en-US"/>
           </a:p>
@@ -14593,7 +14593,7 @@
             <a:fld id="{B51B2453-8663-4C69-AF73-9FD7B1DEC5D0}" type="datetime1">
               <a:rPr lang="en-US" smtClean="0"/>
               <a:pPr/>
-              <a:t>2/13/2023</a:t>
+              <a:t>2/17/2023</a:t>
             </a:fld>
             <a:endParaRPr lang="en-US" dirty="0"/>
           </a:p>
@@ -15643,7 +15643,7 @@
             <p:ph idx="1"/>
             <p:extLst>
               <p:ext uri="{D42A27DB-BD31-4B8C-83A1-F6EECF244321}">
-                <p14:modId xmlns:p14="http://schemas.microsoft.com/office/powerpoint/2010/main" val="1047731671"/>
+                <p14:modId xmlns:p14="http://schemas.microsoft.com/office/powerpoint/2010/main" val="438981640"/>
               </p:ext>
             </p:extLst>
           </p:nvPr>
@@ -15932,6 +15932,12 @@
                     <a:bodyPr/>
                     <a:lstStyle/>
                     <a:p>
+                      <a:r>
+                        <a:rPr lang="en-US" dirty="0">
+                          <a:hlinkClick r:id="rId6"/>
+                        </a:rPr>
+                        <a:t>Temp Sensor</a:t>
+                      </a:r>
                       <a:endParaRPr lang="en-US" dirty="0"/>
                     </a:p>
                   </a:txBody>
@@ -15942,7 +15948,10 @@
                     <a:bodyPr/>
                     <a:lstStyle/>
                     <a:p>
-                      <a:endParaRPr lang="en-US" dirty="0"/>
+                      <a:r>
+                        <a:rPr lang="en-US" dirty="0"/>
+                        <a:t>Y</a:t>
+                      </a:r>
                     </a:p>
                   </a:txBody>
                   <a:tcPr/>
@@ -15952,7 +15961,10 @@
                     <a:bodyPr/>
                     <a:lstStyle/>
                     <a:p>
-                      <a:endParaRPr lang="en-US" dirty="0"/>
+                      <a:r>
+                        <a:rPr lang="en-US" dirty="0"/>
+                        <a:t>16.99</a:t>
+                      </a:r>
                     </a:p>
                   </a:txBody>
                   <a:tcPr/>
@@ -16112,7 +16124,7 @@
           <a:p>
             <a:r>
               <a:rPr lang="en-US" dirty="0"/>
-              <a:t>Total: 39.42</a:t>
+              <a:t>Total: 56.41</a:t>
             </a:r>
           </a:p>
         </p:txBody>

</xml_diff>